<commit_message>
week 14: update slides
</commit_message>
<xml_diff>
--- a/week_14/week_14.pptx
+++ b/week_14/week_14.pptx
@@ -212,7 +212,7 @@
           <a:p>
             <a:fld id="{A756DEA0-F944-5946-9B95-BC7B5255CD05}" type="datetimeFigureOut">
               <a:rPr lang="en-US" smtClean="0"/>
-              <a:t>4/27/16</a:t>
+              <a:t>11/28/16</a:t>
             </a:fld>
             <a:endParaRPr lang="en-US"/>
           </a:p>
@@ -524,7 +524,7 @@
           <a:bodyPr/>
           <a:lstStyle/>
           <a:p>
-            <a:endParaRPr lang="en-US" dirty="0"/>
+            <a:endParaRPr lang="en-US"/>
           </a:p>
         </p:txBody>
       </p:sp>
@@ -545,7 +545,7 @@
           <a:p>
             <a:fld id="{0FF3EE0D-70A9-3744-80A0-179DFFBD3C67}" type="slidenum">
               <a:rPr lang="en-US" smtClean="0"/>
-              <a:t>4</a:t>
+              <a:t>1</a:t>
             </a:fld>
             <a:endParaRPr lang="en-US"/>
           </a:p>
@@ -554,7 +554,7 @@
     </p:spTree>
     <p:extLst>
       <p:ext uri="{BB962C8B-B14F-4D97-AF65-F5344CB8AC3E}">
-        <p14:creationId xmlns:p14="http://schemas.microsoft.com/office/powerpoint/2010/main" val="700590728"/>
+        <p14:creationId xmlns:p14="http://schemas.microsoft.com/office/powerpoint/2010/main" val="1457603246"/>
       </p:ext>
     </p:extLst>
   </p:cSld>
@@ -629,6 +629,90 @@
           <a:p>
             <a:fld id="{0FF3EE0D-70A9-3744-80A0-179DFFBD3C67}" type="slidenum">
               <a:rPr lang="en-US" smtClean="0"/>
+              <a:t>13</a:t>
+            </a:fld>
+            <a:endParaRPr lang="en-US"/>
+          </a:p>
+        </p:txBody>
+      </p:sp>
+    </p:spTree>
+    <p:extLst>
+      <p:ext uri="{BB962C8B-B14F-4D97-AF65-F5344CB8AC3E}">
+        <p14:creationId xmlns:p14="http://schemas.microsoft.com/office/powerpoint/2010/main" val="765079975"/>
+      </p:ext>
+    </p:extLst>
+  </p:cSld>
+  <p:clrMapOvr>
+    <a:masterClrMapping/>
+  </p:clrMapOvr>
+</p:notes>
+</file>
+
+<file path=ppt/notesSlides/notesSlide11.xml><?xml version="1.0" encoding="utf-8"?>
+<p:notes xmlns:a="http://schemas.openxmlformats.org/drawingml/2006/main" xmlns:r="http://schemas.openxmlformats.org/officeDocument/2006/relationships" xmlns:p="http://schemas.openxmlformats.org/presentationml/2006/main">
+  <p:cSld>
+    <p:spTree>
+      <p:nvGrpSpPr>
+        <p:cNvPr id="1" name=""/>
+        <p:cNvGrpSpPr/>
+        <p:nvPr/>
+      </p:nvGrpSpPr>
+      <p:grpSpPr>
+        <a:xfrm>
+          <a:off x="0" y="0"/>
+          <a:ext cx="0" cy="0"/>
+          <a:chOff x="0" y="0"/>
+          <a:chExt cx="0" cy="0"/>
+        </a:xfrm>
+      </p:grpSpPr>
+      <p:sp>
+        <p:nvSpPr>
+          <p:cNvPr id="2" name="Slide Image Placeholder 1"/>
+          <p:cNvSpPr>
+            <a:spLocks noGrp="1" noRot="1" noChangeAspect="1"/>
+          </p:cNvSpPr>
+          <p:nvPr>
+            <p:ph type="sldImg"/>
+          </p:nvPr>
+        </p:nvSpPr>
+        <p:spPr/>
+      </p:sp>
+      <p:sp>
+        <p:nvSpPr>
+          <p:cNvPr id="3" name="Notes Placeholder 2"/>
+          <p:cNvSpPr>
+            <a:spLocks noGrp="1"/>
+          </p:cNvSpPr>
+          <p:nvPr>
+            <p:ph type="body" idx="1"/>
+          </p:nvPr>
+        </p:nvSpPr>
+        <p:spPr/>
+        <p:txBody>
+          <a:bodyPr/>
+          <a:lstStyle/>
+          <a:p>
+            <a:endParaRPr lang="en-US" dirty="0"/>
+          </a:p>
+        </p:txBody>
+      </p:sp>
+      <p:sp>
+        <p:nvSpPr>
+          <p:cNvPr id="4" name="Slide Number Placeholder 3"/>
+          <p:cNvSpPr>
+            <a:spLocks noGrp="1"/>
+          </p:cNvSpPr>
+          <p:nvPr>
+            <p:ph type="sldNum" sz="quarter" idx="10"/>
+          </p:nvPr>
+        </p:nvSpPr>
+        <p:spPr/>
+        <p:txBody>
+          <a:bodyPr/>
+          <a:lstStyle/>
+          <a:p>
+            <a:fld id="{0FF3EE0D-70A9-3744-80A0-179DFFBD3C67}" type="slidenum">
+              <a:rPr lang="en-US" smtClean="0"/>
               <a:t>14</a:t>
             </a:fld>
             <a:endParaRPr lang="en-US"/>
@@ -648,7 +732,7 @@
 </p:notes>
 </file>
 
-<file path=ppt/notesSlides/notesSlide11.xml><?xml version="1.0" encoding="utf-8"?>
+<file path=ppt/notesSlides/notesSlide12.xml><?xml version="1.0" encoding="utf-8"?>
 <p:notes xmlns:a="http://schemas.openxmlformats.org/drawingml/2006/main" xmlns:r="http://schemas.openxmlformats.org/officeDocument/2006/relationships" xmlns:p="http://schemas.openxmlformats.org/presentationml/2006/main">
   <p:cSld>
     <p:spTree>
@@ -797,7 +881,7 @@
           <a:p>
             <a:fld id="{0FF3EE0D-70A9-3744-80A0-179DFFBD3C67}" type="slidenum">
               <a:rPr lang="en-US" smtClean="0"/>
-              <a:t>6</a:t>
+              <a:t>4</a:t>
             </a:fld>
             <a:endParaRPr lang="en-US"/>
           </a:p>
@@ -806,7 +890,7 @@
     </p:spTree>
     <p:extLst>
       <p:ext uri="{BB962C8B-B14F-4D97-AF65-F5344CB8AC3E}">
-        <p14:creationId xmlns:p14="http://schemas.microsoft.com/office/powerpoint/2010/main" val="779980496"/>
+        <p14:creationId xmlns:p14="http://schemas.microsoft.com/office/powerpoint/2010/main" val="700590728"/>
       </p:ext>
     </p:extLst>
   </p:cSld>
@@ -881,7 +965,7 @@
           <a:p>
             <a:fld id="{0FF3EE0D-70A9-3744-80A0-179DFFBD3C67}" type="slidenum">
               <a:rPr lang="en-US" smtClean="0"/>
-              <a:t>7</a:t>
+              <a:t>6</a:t>
             </a:fld>
             <a:endParaRPr lang="en-US"/>
           </a:p>
@@ -890,7 +974,7 @@
     </p:spTree>
     <p:extLst>
       <p:ext uri="{BB962C8B-B14F-4D97-AF65-F5344CB8AC3E}">
-        <p14:creationId xmlns:p14="http://schemas.microsoft.com/office/powerpoint/2010/main" val="1002189756"/>
+        <p14:creationId xmlns:p14="http://schemas.microsoft.com/office/powerpoint/2010/main" val="779980496"/>
       </p:ext>
     </p:extLst>
   </p:cSld>
@@ -965,7 +1049,7 @@
           <a:p>
             <a:fld id="{0FF3EE0D-70A9-3744-80A0-179DFFBD3C67}" type="slidenum">
               <a:rPr lang="en-US" smtClean="0"/>
-              <a:t>8</a:t>
+              <a:t>7</a:t>
             </a:fld>
             <a:endParaRPr lang="en-US"/>
           </a:p>
@@ -974,7 +1058,7 @@
     </p:spTree>
     <p:extLst>
       <p:ext uri="{BB962C8B-B14F-4D97-AF65-F5344CB8AC3E}">
-        <p14:creationId xmlns:p14="http://schemas.microsoft.com/office/powerpoint/2010/main" val="135918628"/>
+        <p14:creationId xmlns:p14="http://schemas.microsoft.com/office/powerpoint/2010/main" val="1002189756"/>
       </p:ext>
     </p:extLst>
   </p:cSld>
@@ -1049,7 +1133,7 @@
           <a:p>
             <a:fld id="{0FF3EE0D-70A9-3744-80A0-179DFFBD3C67}" type="slidenum">
               <a:rPr lang="en-US" smtClean="0"/>
-              <a:t>9</a:t>
+              <a:t>8</a:t>
             </a:fld>
             <a:endParaRPr lang="en-US"/>
           </a:p>
@@ -1058,7 +1142,7 @@
     </p:spTree>
     <p:extLst>
       <p:ext uri="{BB962C8B-B14F-4D97-AF65-F5344CB8AC3E}">
-        <p14:creationId xmlns:p14="http://schemas.microsoft.com/office/powerpoint/2010/main" val="1941386443"/>
+        <p14:creationId xmlns:p14="http://schemas.microsoft.com/office/powerpoint/2010/main" val="135918628"/>
       </p:ext>
     </p:extLst>
   </p:cSld>
@@ -1133,7 +1217,7 @@
           <a:p>
             <a:fld id="{0FF3EE0D-70A9-3744-80A0-179DFFBD3C67}" type="slidenum">
               <a:rPr lang="en-US" smtClean="0"/>
-              <a:t>10</a:t>
+              <a:t>9</a:t>
             </a:fld>
             <a:endParaRPr lang="en-US"/>
           </a:p>
@@ -1142,7 +1226,7 @@
     </p:spTree>
     <p:extLst>
       <p:ext uri="{BB962C8B-B14F-4D97-AF65-F5344CB8AC3E}">
-        <p14:creationId xmlns:p14="http://schemas.microsoft.com/office/powerpoint/2010/main" val="1782318905"/>
+        <p14:creationId xmlns:p14="http://schemas.microsoft.com/office/powerpoint/2010/main" val="1941386443"/>
       </p:ext>
     </p:extLst>
   </p:cSld>
@@ -1217,7 +1301,7 @@
           <a:p>
             <a:fld id="{0FF3EE0D-70A9-3744-80A0-179DFFBD3C67}" type="slidenum">
               <a:rPr lang="en-US" smtClean="0"/>
-              <a:t>11</a:t>
+              <a:t>10</a:t>
             </a:fld>
             <a:endParaRPr lang="en-US"/>
           </a:p>
@@ -1226,7 +1310,7 @@
     </p:spTree>
     <p:extLst>
       <p:ext uri="{BB962C8B-B14F-4D97-AF65-F5344CB8AC3E}">
-        <p14:creationId xmlns:p14="http://schemas.microsoft.com/office/powerpoint/2010/main" val="277319289"/>
+        <p14:creationId xmlns:p14="http://schemas.microsoft.com/office/powerpoint/2010/main" val="1782318905"/>
       </p:ext>
     </p:extLst>
   </p:cSld>
@@ -1301,7 +1385,7 @@
           <a:p>
             <a:fld id="{0FF3EE0D-70A9-3744-80A0-179DFFBD3C67}" type="slidenum">
               <a:rPr lang="en-US" smtClean="0"/>
-              <a:t>12</a:t>
+              <a:t>11</a:t>
             </a:fld>
             <a:endParaRPr lang="en-US"/>
           </a:p>
@@ -1310,7 +1394,7 @@
     </p:spTree>
     <p:extLst>
       <p:ext uri="{BB962C8B-B14F-4D97-AF65-F5344CB8AC3E}">
-        <p14:creationId xmlns:p14="http://schemas.microsoft.com/office/powerpoint/2010/main" val="1752086253"/>
+        <p14:creationId xmlns:p14="http://schemas.microsoft.com/office/powerpoint/2010/main" val="277319289"/>
       </p:ext>
     </p:extLst>
   </p:cSld>
@@ -1385,7 +1469,7 @@
           <a:p>
             <a:fld id="{0FF3EE0D-70A9-3744-80A0-179DFFBD3C67}" type="slidenum">
               <a:rPr lang="en-US" smtClean="0"/>
-              <a:t>13</a:t>
+              <a:t>12</a:t>
             </a:fld>
             <a:endParaRPr lang="en-US"/>
           </a:p>
@@ -1394,7 +1478,7 @@
     </p:spTree>
     <p:extLst>
       <p:ext uri="{BB962C8B-B14F-4D97-AF65-F5344CB8AC3E}">
-        <p14:creationId xmlns:p14="http://schemas.microsoft.com/office/powerpoint/2010/main" val="765079975"/>
+        <p14:creationId xmlns:p14="http://schemas.microsoft.com/office/powerpoint/2010/main" val="1752086253"/>
       </p:ext>
     </p:extLst>
   </p:cSld>
@@ -1570,9 +1654,9 @@
             </a:lvl1pPr>
           </a:lstStyle>
           <a:p>
-            <a:fld id="{9E016143-E03C-4CFD-AFDC-14E5BDEA754C}" type="datetimeFigureOut">
-              <a:rPr lang="en-US" dirty="0"/>
-              <a:t>4/27/16</a:t>
+            <a:fld id="{4541D6B6-C1C0-DB45-AF11-210761237FDC}" type="datetime1">
+              <a:rPr lang="en-US" smtClean="0"/>
+              <a:t>11/28/16</a:t>
             </a:fld>
             <a:endParaRPr lang="en-US" dirty="0"/>
           </a:p>
@@ -1794,9 +1878,9 @@
           <a:bodyPr/>
           <a:lstStyle/>
           <a:p>
-            <a:fld id="{C033E54A-A8CA-48C1-9504-691B58049D29}" type="datetimeFigureOut">
-              <a:rPr lang="en-US" dirty="0"/>
-              <a:t>4/27/16</a:t>
+            <a:fld id="{8083127B-89B4-0A4A-8900-4EB1102FB651}" type="datetime1">
+              <a:rPr lang="en-US" smtClean="0"/>
+              <a:t>11/28/16</a:t>
             </a:fld>
             <a:endParaRPr lang="en-US" dirty="0"/>
           </a:p>
@@ -1969,9 +2053,9 @@
           <a:bodyPr/>
           <a:lstStyle/>
           <a:p>
-            <a:fld id="{B5F6C806-BBF7-471C-9527-881CE2266695}" type="datetimeFigureOut">
-              <a:rPr lang="en-US" dirty="0"/>
-              <a:t>4/27/16</a:t>
+            <a:fld id="{45988ED9-D310-394B-BAE4-87302E2580E3}" type="datetime1">
+              <a:rPr lang="en-US" smtClean="0"/>
+              <a:t>11/28/16</a:t>
             </a:fld>
             <a:endParaRPr lang="en-US" dirty="0"/>
           </a:p>
@@ -2134,9 +2218,9 @@
           <a:bodyPr/>
           <a:lstStyle/>
           <a:p>
-            <a:fld id="{78C94063-DF36-4330-A365-08DA1FA5B7D6}" type="datetimeFigureOut">
-              <a:rPr lang="en-US" dirty="0"/>
-              <a:t>4/27/16</a:t>
+            <a:fld id="{CE38A697-CEE5-0949-A549-1E01AED1D125}" type="datetime1">
+              <a:rPr lang="en-US" smtClean="0"/>
+              <a:t>11/28/16</a:t>
             </a:fld>
             <a:endParaRPr lang="en-US" dirty="0"/>
           </a:p>
@@ -2383,9 +2467,9 @@
           <a:bodyPr/>
           <a:lstStyle/>
           <a:p>
-            <a:fld id="{908A7C6C-0F39-4D70-8E8D-FE5B9C95FA73}" type="datetimeFigureOut">
-              <a:rPr lang="en-US" dirty="0"/>
-              <a:t>4/27/16</a:t>
+            <a:fld id="{1F7C9E29-66CA-5848-A0B5-DD6B8859618F}" type="datetime1">
+              <a:rPr lang="en-US" smtClean="0"/>
+              <a:t>11/28/16</a:t>
             </a:fld>
             <a:endParaRPr lang="en-US" dirty="0"/>
           </a:p>
@@ -2704,9 +2788,9 @@
           <a:bodyPr/>
           <a:lstStyle/>
           <a:p>
-            <a:fld id="{DFCFA4AC-08CC-42CE-BD01-C191750A04EC}" type="datetimeFigureOut">
-              <a:rPr lang="en-US" dirty="0"/>
-              <a:t>4/27/16</a:t>
+            <a:fld id="{158149A8-F513-8843-9EF2-BA459149E1B4}" type="datetime1">
+              <a:rPr lang="en-US" smtClean="0"/>
+              <a:t>11/28/16</a:t>
             </a:fld>
             <a:endParaRPr lang="en-US" dirty="0"/>
           </a:p>
@@ -3150,9 +3234,9 @@
           <a:bodyPr/>
           <a:lstStyle/>
           <a:p>
-            <a:fld id="{1BA7A723-92A7-435B-B681-F25B092FEFEB}" type="datetimeFigureOut">
-              <a:rPr lang="en-US" dirty="0"/>
-              <a:t>4/27/16</a:t>
+            <a:fld id="{2596519E-859D-B04F-9677-2582A858924F}" type="datetime1">
+              <a:rPr lang="en-US" smtClean="0"/>
+              <a:t>11/28/16</a:t>
             </a:fld>
             <a:endParaRPr lang="en-US" dirty="0"/>
           </a:p>
@@ -3263,9 +3347,9 @@
           <a:bodyPr/>
           <a:lstStyle/>
           <a:p>
-            <a:fld id="{4F170639-886C-4FCF-9EAB-ABB5DA3F3F4A}" type="datetimeFigureOut">
-              <a:rPr lang="en-US" dirty="0"/>
-              <a:t>4/27/16</a:t>
+            <a:fld id="{020EB0EC-D16F-CD43-B016-D677DE1A49A6}" type="datetime1">
+              <a:rPr lang="en-US" smtClean="0"/>
+              <a:t>11/28/16</a:t>
             </a:fld>
             <a:endParaRPr lang="en-US" dirty="0"/>
           </a:p>
@@ -3353,9 +3437,9 @@
           <a:bodyPr/>
           <a:lstStyle/>
           <a:p>
-            <a:fld id="{22230651-31F4-45D2-98AE-A2108F41BC07}" type="datetimeFigureOut">
-              <a:rPr lang="en-US" dirty="0"/>
-              <a:t>4/27/16</a:t>
+            <a:fld id="{4B9C08BF-1163-1B4F-94AA-0AAAB83D9B3A}" type="datetime1">
+              <a:rPr lang="en-US" smtClean="0"/>
+              <a:t>11/28/16</a:t>
             </a:fld>
             <a:endParaRPr lang="en-US" dirty="0"/>
           </a:p>
@@ -3635,9 +3719,9 @@
           <a:bodyPr/>
           <a:lstStyle/>
           <a:p>
-            <a:fld id="{6F53789A-C914-4DB1-8815-80B5EC7335C5}" type="datetimeFigureOut">
-              <a:rPr lang="en-US" dirty="0"/>
-              <a:t>4/27/16</a:t>
+            <a:fld id="{44979026-6EA9-8744-B710-FC1AFB118E7E}" type="datetime1">
+              <a:rPr lang="en-US" smtClean="0"/>
+              <a:t>11/28/16</a:t>
             </a:fld>
             <a:endParaRPr lang="en-US" dirty="0"/>
           </a:p>
@@ -3955,9 +4039,9 @@
           <a:bodyPr/>
           <a:lstStyle/>
           <a:p>
-            <a:fld id="{5E6440AA-91A0-436F-8FDB-C0F939DCAE21}" type="datetimeFigureOut">
-              <a:rPr lang="en-US" dirty="0"/>
-              <a:t>4/27/16</a:t>
+            <a:fld id="{6C2D5E1B-7098-BC44-84AB-85397B19882E}" type="datetime1">
+              <a:rPr lang="en-US" smtClean="0"/>
+              <a:t>11/28/16</a:t>
             </a:fld>
             <a:endParaRPr lang="en-US" dirty="0"/>
           </a:p>
@@ -4204,9 +4288,9 @@
             </a:lvl1pPr>
           </a:lstStyle>
           <a:p>
-            <a:fld id="{0E59FD0C-5451-4CA0-86AF-E70AE3279989}" type="datetimeFigureOut">
-              <a:rPr lang="en-US" dirty="0"/>
-              <a:t>4/27/16</a:t>
+            <a:fld id="{5B411BF3-D3C9-A442-8623-8A43675A47F2}" type="datetime1">
+              <a:rPr lang="en-US" smtClean="0"/>
+              <a:t>11/28/16</a:t>
             </a:fld>
             <a:endParaRPr lang="en-US" dirty="0"/>
           </a:p>
@@ -4311,7 +4395,7 @@
     <p:sldLayoutId id="2147483850" r:id="rId10"/>
     <p:sldLayoutId id="2147483851" r:id="rId11"/>
   </p:sldLayoutIdLst>
-  <p:hf sldNum="0" hdr="0" ftr="0" dt="0"/>
+  <p:hf hdr="0" ftr="0" dt="0"/>
   <p:txStyles>
     <p:titleStyle>
       <a:lvl1pPr algn="l" defTabSz="914400" rtl="0" eaLnBrk="1" latinLnBrk="0" hangingPunct="1">
@@ -4731,23 +4815,38 @@
           <a:p>
             <a:r>
               <a:rPr lang="en-US" dirty="0" smtClean="0"/>
-              <a:t>Week </a:t>
+              <a:t>Week 14: </a:t>
             </a:r>
             <a:r>
               <a:rPr lang="en-US" dirty="0" smtClean="0"/>
-              <a:t>14: JSON</a:t>
+              <a:t>JSON</a:t>
             </a:r>
             <a:endParaRPr lang="en-US" dirty="0" smtClean="0"/>
           </a:p>
-          <a:p>
-            <a:r>
-              <a:rPr lang="en-US" dirty="0" smtClean="0"/>
-              <a:t>April </a:t>
-            </a:r>
-            <a:r>
-              <a:rPr lang="en-US" dirty="0" smtClean="0"/>
-              <a:t>28, 2016</a:t>
-            </a:r>
+        </p:txBody>
+      </p:sp>
+      <p:sp>
+        <p:nvSpPr>
+          <p:cNvPr id="4" name="Slide Number Placeholder 3"/>
+          <p:cNvSpPr>
+            <a:spLocks noGrp="1"/>
+          </p:cNvSpPr>
+          <p:nvPr>
+            <p:ph type="sldNum" sz="quarter" idx="12"/>
+          </p:nvPr>
+        </p:nvSpPr>
+        <p:spPr/>
+        <p:txBody>
+          <a:bodyPr>
+            <a:normAutofit lnSpcReduction="10000"/>
+          </a:bodyPr>
+          <a:lstStyle/>
+          <a:p>
+            <a:fld id="{4FAB73BC-B049-4115-A692-8D63A059BFB8}" type="slidenum">
+              <a:rPr lang="en-US" smtClean="0"/>
+              <a:pPr/>
+              <a:t>1</a:t>
+            </a:fld>
             <a:endParaRPr lang="en-US" dirty="0"/>
           </a:p>
         </p:txBody>
@@ -4996,6 +5095,29 @@
               <a:ea typeface="Consolas" charset="0"/>
               <a:cs typeface="Consolas" charset="0"/>
             </a:endParaRPr>
+          </a:p>
+        </p:txBody>
+      </p:sp>
+      <p:sp>
+        <p:nvSpPr>
+          <p:cNvPr id="2" name="Slide Number Placeholder 1"/>
+          <p:cNvSpPr>
+            <a:spLocks noGrp="1"/>
+          </p:cNvSpPr>
+          <p:nvPr>
+            <p:ph type="sldNum" sz="quarter" idx="12"/>
+          </p:nvPr>
+        </p:nvSpPr>
+        <p:spPr/>
+        <p:txBody>
+          <a:bodyPr/>
+          <a:lstStyle/>
+          <a:p>
+            <a:fld id="{4FAB73BC-B049-4115-A692-8D63A059BFB8}" type="slidenum">
+              <a:rPr lang="en-US" smtClean="0"/>
+              <a:t>10</a:t>
+            </a:fld>
+            <a:endParaRPr lang="en-US" dirty="0"/>
           </a:p>
         </p:txBody>
       </p:sp>
@@ -5740,6 +5862,29 @@
           </a:fontRef>
         </p:style>
       </p:cxnSp>
+      <p:sp>
+        <p:nvSpPr>
+          <p:cNvPr id="2" name="Slide Number Placeholder 1"/>
+          <p:cNvSpPr>
+            <a:spLocks noGrp="1"/>
+          </p:cNvSpPr>
+          <p:nvPr>
+            <p:ph type="sldNum" sz="quarter" idx="12"/>
+          </p:nvPr>
+        </p:nvSpPr>
+        <p:spPr/>
+        <p:txBody>
+          <a:bodyPr/>
+          <a:lstStyle/>
+          <a:p>
+            <a:fld id="{4FAB73BC-B049-4115-A692-8D63A059BFB8}" type="slidenum">
+              <a:rPr lang="en-US" smtClean="0"/>
+              <a:t>11</a:t>
+            </a:fld>
+            <a:endParaRPr lang="en-US" dirty="0"/>
+          </a:p>
+        </p:txBody>
+      </p:sp>
     </p:spTree>
     <p:extLst>
       <p:ext uri="{BB962C8B-B14F-4D97-AF65-F5344CB8AC3E}">
@@ -5840,6 +5985,29 @@
           </a:p>
         </p:txBody>
       </p:sp>
+      <p:sp>
+        <p:nvSpPr>
+          <p:cNvPr id="4" name="Slide Number Placeholder 3"/>
+          <p:cNvSpPr>
+            <a:spLocks noGrp="1"/>
+          </p:cNvSpPr>
+          <p:nvPr>
+            <p:ph type="sldNum" sz="quarter" idx="12"/>
+          </p:nvPr>
+        </p:nvSpPr>
+        <p:spPr/>
+        <p:txBody>
+          <a:bodyPr/>
+          <a:lstStyle/>
+          <a:p>
+            <a:fld id="{4FAB73BC-B049-4115-A692-8D63A059BFB8}" type="slidenum">
+              <a:rPr lang="en-US" smtClean="0"/>
+              <a:t>12</a:t>
+            </a:fld>
+            <a:endParaRPr lang="en-US" dirty="0"/>
+          </a:p>
+        </p:txBody>
+      </p:sp>
     </p:spTree>
     <p:extLst>
       <p:ext uri="{BB962C8B-B14F-4D97-AF65-F5344CB8AC3E}">
@@ -6517,6 +6685,29 @@
           </a:p>
         </p:txBody>
       </p:sp>
+      <p:sp>
+        <p:nvSpPr>
+          <p:cNvPr id="4" name="Slide Number Placeholder 3"/>
+          <p:cNvSpPr>
+            <a:spLocks noGrp="1"/>
+          </p:cNvSpPr>
+          <p:nvPr>
+            <p:ph type="sldNum" sz="quarter" idx="12"/>
+          </p:nvPr>
+        </p:nvSpPr>
+        <p:spPr/>
+        <p:txBody>
+          <a:bodyPr/>
+          <a:lstStyle/>
+          <a:p>
+            <a:fld id="{4FAB73BC-B049-4115-A692-8D63A059BFB8}" type="slidenum">
+              <a:rPr lang="en-US" smtClean="0"/>
+              <a:t>13</a:t>
+            </a:fld>
+            <a:endParaRPr lang="en-US" dirty="0"/>
+          </a:p>
+        </p:txBody>
+      </p:sp>
     </p:spTree>
     <p:extLst>
       <p:ext uri="{BB962C8B-B14F-4D97-AF65-F5344CB8AC3E}">
@@ -6633,7 +6824,29 @@
               <a:rPr lang="en-US" sz="3000" dirty="0" smtClean="0"/>
               <a:t> to convert the data</a:t>
             </a:r>
-            <a:endParaRPr lang="en-US" sz="3000" dirty="0" smtClean="0"/>
+          </a:p>
+        </p:txBody>
+      </p:sp>
+      <p:sp>
+        <p:nvSpPr>
+          <p:cNvPr id="4" name="Slide Number Placeholder 3"/>
+          <p:cNvSpPr>
+            <a:spLocks noGrp="1"/>
+          </p:cNvSpPr>
+          <p:nvPr>
+            <p:ph type="sldNum" sz="quarter" idx="12"/>
+          </p:nvPr>
+        </p:nvSpPr>
+        <p:spPr/>
+        <p:txBody>
+          <a:bodyPr/>
+          <a:lstStyle/>
+          <a:p>
+            <a:fld id="{4FAB73BC-B049-4115-A692-8D63A059BFB8}" type="slidenum">
+              <a:rPr lang="en-US" smtClean="0"/>
+              <a:t>14</a:t>
+            </a:fld>
+            <a:endParaRPr lang="en-US" dirty="0"/>
           </a:p>
         </p:txBody>
       </p:sp>
@@ -6747,6 +6960,29 @@
           </a:p>
         </p:txBody>
       </p:sp>
+      <p:sp>
+        <p:nvSpPr>
+          <p:cNvPr id="4" name="Slide Number Placeholder 3"/>
+          <p:cNvSpPr>
+            <a:spLocks noGrp="1"/>
+          </p:cNvSpPr>
+          <p:nvPr>
+            <p:ph type="sldNum" sz="quarter" idx="12"/>
+          </p:nvPr>
+        </p:nvSpPr>
+        <p:spPr/>
+        <p:txBody>
+          <a:bodyPr/>
+          <a:lstStyle/>
+          <a:p>
+            <a:fld id="{4FAB73BC-B049-4115-A692-8D63A059BFB8}" type="slidenum">
+              <a:rPr lang="en-US" smtClean="0"/>
+              <a:t>15</a:t>
+            </a:fld>
+            <a:endParaRPr lang="en-US" dirty="0"/>
+          </a:p>
+        </p:txBody>
+      </p:sp>
     </p:spTree>
     <p:extLst>
       <p:ext uri="{BB962C8B-B14F-4D97-AF65-F5344CB8AC3E}">
@@ -7516,6 +7752,29 @@
           </a:p>
         </p:txBody>
       </p:sp>
+      <p:sp>
+        <p:nvSpPr>
+          <p:cNvPr id="4" name="Slide Number Placeholder 3"/>
+          <p:cNvSpPr>
+            <a:spLocks noGrp="1"/>
+          </p:cNvSpPr>
+          <p:nvPr>
+            <p:ph type="sldNum" sz="quarter" idx="12"/>
+          </p:nvPr>
+        </p:nvSpPr>
+        <p:spPr/>
+        <p:txBody>
+          <a:bodyPr/>
+          <a:lstStyle/>
+          <a:p>
+            <a:fld id="{4FAB73BC-B049-4115-A692-8D63A059BFB8}" type="slidenum">
+              <a:rPr lang="en-US" smtClean="0"/>
+              <a:t>16</a:t>
+            </a:fld>
+            <a:endParaRPr lang="en-US" dirty="0"/>
+          </a:p>
+        </p:txBody>
+      </p:sp>
     </p:spTree>
     <p:extLst>
       <p:ext uri="{BB962C8B-B14F-4D97-AF65-F5344CB8AC3E}">
@@ -7592,13 +7851,34 @@
             </a:r>
             <a:r>
               <a:rPr lang="en-US" sz="2800" dirty="0" smtClean="0"/>
-              <a:t>, pp. </a:t>
-            </a:r>
-            <a:r>
-              <a:rPr lang="en-US" sz="2800" dirty="0" smtClean="0"/>
-              <a:t>205-217</a:t>
+              <a:t>, pp. 205-217</a:t>
             </a:r>
             <a:endParaRPr lang="en-US" sz="2800" i="1" dirty="0"/>
+          </a:p>
+        </p:txBody>
+      </p:sp>
+      <p:sp>
+        <p:nvSpPr>
+          <p:cNvPr id="4" name="Slide Number Placeholder 3"/>
+          <p:cNvSpPr>
+            <a:spLocks noGrp="1"/>
+          </p:cNvSpPr>
+          <p:nvPr>
+            <p:ph type="sldNum" sz="quarter" idx="12"/>
+          </p:nvPr>
+        </p:nvSpPr>
+        <p:spPr/>
+        <p:txBody>
+          <a:bodyPr>
+            <a:normAutofit lnSpcReduction="10000"/>
+          </a:bodyPr>
+          <a:lstStyle/>
+          <a:p>
+            <a:fld id="{4FAB73BC-B049-4115-A692-8D63A059BFB8}" type="slidenum">
+              <a:rPr lang="en-US" smtClean="0"/>
+              <a:t>2</a:t>
+            </a:fld>
+            <a:endParaRPr lang="en-US" dirty="0"/>
           </a:p>
         </p:txBody>
       </p:sp>
@@ -7674,6 +7954,29 @@
           </a:p>
         </p:txBody>
       </p:sp>
+      <p:sp>
+        <p:nvSpPr>
+          <p:cNvPr id="2" name="Slide Number Placeholder 1"/>
+          <p:cNvSpPr>
+            <a:spLocks noGrp="1"/>
+          </p:cNvSpPr>
+          <p:nvPr>
+            <p:ph type="sldNum" sz="quarter" idx="12"/>
+          </p:nvPr>
+        </p:nvSpPr>
+        <p:spPr/>
+        <p:txBody>
+          <a:bodyPr/>
+          <a:lstStyle/>
+          <a:p>
+            <a:fld id="{4FAB73BC-B049-4115-A692-8D63A059BFB8}" type="slidenum">
+              <a:rPr lang="en-US" smtClean="0"/>
+              <a:t>3</a:t>
+            </a:fld>
+            <a:endParaRPr lang="en-US" dirty="0"/>
+          </a:p>
+        </p:txBody>
+      </p:sp>
     </p:spTree>
     <p:extLst>
       <p:ext uri="{BB962C8B-B14F-4D97-AF65-F5344CB8AC3E}">
@@ -7795,7 +8098,29 @@
               <a:rPr lang="en-US" sz="3000" dirty="0" smtClean="0"/>
               <a:t> library in order to work with JSON.</a:t>
             </a:r>
-            <a:endParaRPr lang="en-US" sz="3000" dirty="0" smtClean="0"/>
+          </a:p>
+        </p:txBody>
+      </p:sp>
+      <p:sp>
+        <p:nvSpPr>
+          <p:cNvPr id="4" name="Slide Number Placeholder 3"/>
+          <p:cNvSpPr>
+            <a:spLocks noGrp="1"/>
+          </p:cNvSpPr>
+          <p:nvPr>
+            <p:ph type="sldNum" sz="quarter" idx="12"/>
+          </p:nvPr>
+        </p:nvSpPr>
+        <p:spPr/>
+        <p:txBody>
+          <a:bodyPr/>
+          <a:lstStyle/>
+          <a:p>
+            <a:fld id="{4FAB73BC-B049-4115-A692-8D63A059BFB8}" type="slidenum">
+              <a:rPr lang="en-US" smtClean="0"/>
+              <a:t>4</a:t>
+            </a:fld>
+            <a:endParaRPr lang="en-US" dirty="0"/>
           </a:p>
         </p:txBody>
       </p:sp>
@@ -7871,6 +8196,29 @@
           </a:p>
         </p:txBody>
       </p:sp>
+      <p:sp>
+        <p:nvSpPr>
+          <p:cNvPr id="2" name="Slide Number Placeholder 1"/>
+          <p:cNvSpPr>
+            <a:spLocks noGrp="1"/>
+          </p:cNvSpPr>
+          <p:nvPr>
+            <p:ph type="sldNum" sz="quarter" idx="12"/>
+          </p:nvPr>
+        </p:nvSpPr>
+        <p:spPr/>
+        <p:txBody>
+          <a:bodyPr/>
+          <a:lstStyle/>
+          <a:p>
+            <a:fld id="{4FAB73BC-B049-4115-A692-8D63A059BFB8}" type="slidenum">
+              <a:rPr lang="en-US" smtClean="0"/>
+              <a:t>5</a:t>
+            </a:fld>
+            <a:endParaRPr lang="en-US" dirty="0"/>
+          </a:p>
+        </p:txBody>
+      </p:sp>
     </p:spTree>
     <p:extLst>
       <p:ext uri="{BB962C8B-B14F-4D97-AF65-F5344CB8AC3E}">
@@ -7957,7 +8305,29 @@
               <a:rPr lang="en-US" sz="3000" dirty="0" smtClean="0"/>
               <a:t>Often used to send/receive data to/from a web server</a:t>
             </a:r>
-            <a:endParaRPr lang="en-US" sz="3000" dirty="0" smtClean="0"/>
+          </a:p>
+        </p:txBody>
+      </p:sp>
+      <p:sp>
+        <p:nvSpPr>
+          <p:cNvPr id="4" name="Slide Number Placeholder 3"/>
+          <p:cNvSpPr>
+            <a:spLocks noGrp="1"/>
+          </p:cNvSpPr>
+          <p:nvPr>
+            <p:ph type="sldNum" sz="quarter" idx="12"/>
+          </p:nvPr>
+        </p:nvSpPr>
+        <p:spPr/>
+        <p:txBody>
+          <a:bodyPr/>
+          <a:lstStyle/>
+          <a:p>
+            <a:fld id="{4FAB73BC-B049-4115-A692-8D63A059BFB8}" type="slidenum">
+              <a:rPr lang="en-US" smtClean="0"/>
+              <a:t>6</a:t>
+            </a:fld>
+            <a:endParaRPr lang="en-US" dirty="0"/>
           </a:p>
         </p:txBody>
       </p:sp>
@@ -8129,7 +8499,29 @@
               <a:rPr lang="en-US" sz="3000" dirty="0" smtClean="0"/>
               <a:t>: an empty value</a:t>
             </a:r>
-            <a:endParaRPr lang="en-US" sz="3000" dirty="0" smtClean="0"/>
+          </a:p>
+        </p:txBody>
+      </p:sp>
+      <p:sp>
+        <p:nvSpPr>
+          <p:cNvPr id="4" name="Slide Number Placeholder 3"/>
+          <p:cNvSpPr>
+            <a:spLocks noGrp="1"/>
+          </p:cNvSpPr>
+          <p:nvPr>
+            <p:ph type="sldNum" sz="quarter" idx="12"/>
+          </p:nvPr>
+        </p:nvSpPr>
+        <p:spPr/>
+        <p:txBody>
+          <a:bodyPr/>
+          <a:lstStyle/>
+          <a:p>
+            <a:fld id="{4FAB73BC-B049-4115-A692-8D63A059BFB8}" type="slidenum">
+              <a:rPr lang="en-US" smtClean="0"/>
+              <a:t>7</a:t>
+            </a:fld>
+            <a:endParaRPr lang="en-US" dirty="0"/>
           </a:p>
         </p:txBody>
       </p:sp>
@@ -8246,6 +8638,29 @@
               <a:ea typeface="Consolas" charset="0"/>
               <a:cs typeface="Consolas" charset="0"/>
             </a:endParaRPr>
+          </a:p>
+        </p:txBody>
+      </p:sp>
+      <p:sp>
+        <p:nvSpPr>
+          <p:cNvPr id="2" name="Slide Number Placeholder 1"/>
+          <p:cNvSpPr>
+            <a:spLocks noGrp="1"/>
+          </p:cNvSpPr>
+          <p:nvPr>
+            <p:ph type="sldNum" sz="quarter" idx="12"/>
+          </p:nvPr>
+        </p:nvSpPr>
+        <p:spPr/>
+        <p:txBody>
+          <a:bodyPr/>
+          <a:lstStyle/>
+          <a:p>
+            <a:fld id="{4FAB73BC-B049-4115-A692-8D63A059BFB8}" type="slidenum">
+              <a:rPr lang="en-US" smtClean="0"/>
+              <a:t>8</a:t>
+            </a:fld>
+            <a:endParaRPr lang="en-US" dirty="0"/>
           </a:p>
         </p:txBody>
       </p:sp>
@@ -8665,6 +9080,29 @@
           </a:fontRef>
         </p:style>
       </p:cxnSp>
+      <p:sp>
+        <p:nvSpPr>
+          <p:cNvPr id="2" name="Slide Number Placeholder 1"/>
+          <p:cNvSpPr>
+            <a:spLocks noGrp="1"/>
+          </p:cNvSpPr>
+          <p:nvPr>
+            <p:ph type="sldNum" sz="quarter" idx="12"/>
+          </p:nvPr>
+        </p:nvSpPr>
+        <p:spPr/>
+        <p:txBody>
+          <a:bodyPr/>
+          <a:lstStyle/>
+          <a:p>
+            <a:fld id="{4FAB73BC-B049-4115-A692-8D63A059BFB8}" type="slidenum">
+              <a:rPr lang="en-US" smtClean="0"/>
+              <a:t>9</a:t>
+            </a:fld>
+            <a:endParaRPr lang="en-US" dirty="0"/>
+          </a:p>
+        </p:txBody>
+      </p:sp>
     </p:spTree>
     <p:extLst>
       <p:ext uri="{BB962C8B-B14F-4D97-AF65-F5344CB8AC3E}">

</xml_diff>